<commit_message>
minor fix to fastq slides
</commit_message>
<xml_diff>
--- a/assets/lectures/cbw/2021/mini/RNASeq_MiniLecture_01_01_FASTA_FASTQ_GTF.pptx
+++ b/assets/lectures/cbw/2021/mini/RNASeq_MiniLecture_01_01_FASTA_FASTQ_GTF.pptx
@@ -207,7 +207,7 @@
           <a:p>
             <a:fld id="{827BD9F9-8452-A342-BB1B-28ECF19E2CC5}" type="datetimeFigureOut">
               <a:rPr lang="en-US" smtClean="0"/>
-              <a:t>9/7/21</a:t>
+              <a:t>9/8/21</a:t>
             </a:fld>
             <a:endParaRPr lang="en-US"/>
           </a:p>
@@ -3341,14 +3341,14 @@
           </a:ln>
           <a:extLst>
             <a:ext uri="{909E8E84-426E-40dd-AFC4-6F175D3DCCD1}">
-              <a14:hiddenFill xmlns="" xmlns:a14="http://schemas.microsoft.com/office/drawing/2010/main">
+              <a14:hiddenFill xmlns:a14="http://schemas.microsoft.com/office/drawing/2010/main" xmlns="">
                 <a:solidFill>
                   <a:srgbClr val="FFFFFF"/>
                 </a:solidFill>
               </a14:hiddenFill>
             </a:ext>
             <a:ext uri="{91240B29-F687-4f45-9708-019B960494DF}">
-              <a14:hiddenLine xmlns="" xmlns:a14="http://schemas.microsoft.com/office/drawing/2010/main" w="9525">
+              <a14:hiddenLine xmlns:a14="http://schemas.microsoft.com/office/drawing/2010/main" xmlns="" w="9525">
                 <a:solidFill>
                   <a:srgbClr val="000000"/>
                 </a:solidFill>
@@ -4467,7 +4467,7 @@
         </p:nvCxnSpPr>
         <p:spPr>
           <a:xfrm flipH="1">
-            <a:off x="1882558" y="2633492"/>
+            <a:off x="2013186" y="2633492"/>
             <a:ext cx="230807" cy="0"/>
           </a:xfrm>
           <a:prstGeom prst="line">
@@ -4510,7 +4510,7 @@
         </p:nvCxnSpPr>
         <p:spPr>
           <a:xfrm flipV="1">
-            <a:off x="2000423" y="2634537"/>
+            <a:off x="2131051" y="2634537"/>
             <a:ext cx="1" cy="385762"/>
           </a:xfrm>
           <a:prstGeom prst="line">
@@ -4551,7 +4551,7 @@
         </p:nvSpPr>
         <p:spPr>
           <a:xfrm>
-            <a:off x="1552572" y="3042098"/>
+            <a:off x="1683200" y="3042098"/>
             <a:ext cx="899985" cy="507831"/>
           </a:xfrm>
           <a:prstGeom prst="rect">
@@ -4592,7 +4592,7 @@
         </p:nvCxnSpPr>
         <p:spPr>
           <a:xfrm flipH="1" flipV="1">
-            <a:off x="4834995" y="2620877"/>
+            <a:off x="5060627" y="2620877"/>
             <a:ext cx="12209" cy="772026"/>
           </a:xfrm>
           <a:prstGeom prst="line">
@@ -4635,7 +4635,7 @@
         </p:nvCxnSpPr>
         <p:spPr>
           <a:xfrm flipH="1">
-            <a:off x="4535092" y="2620877"/>
+            <a:off x="4760724" y="2620877"/>
             <a:ext cx="549242" cy="0"/>
           </a:xfrm>
           <a:prstGeom prst="line">
@@ -4676,7 +4676,7 @@
         </p:nvSpPr>
         <p:spPr>
           <a:xfrm>
-            <a:off x="4586036" y="3405517"/>
+            <a:off x="4811668" y="3405517"/>
             <a:ext cx="522387" cy="300082"/>
           </a:xfrm>
           <a:prstGeom prst="rect">
@@ -4717,7 +4717,7 @@
         </p:nvCxnSpPr>
         <p:spPr>
           <a:xfrm flipH="1" flipV="1">
-            <a:off x="5902273" y="2621633"/>
+            <a:off x="6056651" y="2621633"/>
             <a:ext cx="1" cy="398567"/>
           </a:xfrm>
           <a:prstGeom prst="line">
@@ -4760,7 +4760,7 @@
         </p:nvCxnSpPr>
         <p:spPr>
           <a:xfrm flipH="1">
-            <a:off x="5617372" y="2621630"/>
+            <a:off x="5771750" y="2621630"/>
             <a:ext cx="645608" cy="0"/>
           </a:xfrm>
           <a:prstGeom prst="line">
@@ -4801,7 +4801,7 @@
         </p:nvSpPr>
         <p:spPr>
           <a:xfrm>
-            <a:off x="5675298" y="3019752"/>
+            <a:off x="5829676" y="3019752"/>
             <a:ext cx="452368" cy="300082"/>
           </a:xfrm>
           <a:prstGeom prst="rect">
@@ -4842,7 +4842,7 @@
         </p:nvCxnSpPr>
         <p:spPr>
           <a:xfrm flipH="1" flipV="1">
-            <a:off x="6702048" y="2645557"/>
+            <a:off x="6785173" y="2645557"/>
             <a:ext cx="3599" cy="746358"/>
           </a:xfrm>
           <a:prstGeom prst="line">
@@ -4885,7 +4885,7 @@
         </p:nvCxnSpPr>
         <p:spPr>
           <a:xfrm flipH="1">
-            <a:off x="6603203" y="2622392"/>
+            <a:off x="6686328" y="2622392"/>
             <a:ext cx="182166" cy="0"/>
           </a:xfrm>
           <a:prstGeom prst="line">
@@ -4926,7 +4926,7 @@
         </p:nvSpPr>
         <p:spPr>
           <a:xfrm>
-            <a:off x="6422325" y="3402631"/>
+            <a:off x="6505450" y="3402631"/>
             <a:ext cx="573683" cy="300082"/>
           </a:xfrm>
           <a:prstGeom prst="rect">
@@ -4967,7 +4967,7 @@
         </p:nvCxnSpPr>
         <p:spPr>
           <a:xfrm flipV="1">
-            <a:off x="7454155" y="2637463"/>
+            <a:off x="7513530" y="2637463"/>
             <a:ext cx="0" cy="765168"/>
           </a:xfrm>
           <a:prstGeom prst="line">
@@ -5010,7 +5010,7 @@
         </p:nvCxnSpPr>
         <p:spPr>
           <a:xfrm flipH="1">
-            <a:off x="7342087" y="2634904"/>
+            <a:off x="7401462" y="2634904"/>
             <a:ext cx="219605" cy="0"/>
           </a:xfrm>
           <a:prstGeom prst="line">
@@ -5051,8 +5051,8 @@
         </p:nvSpPr>
         <p:spPr>
           <a:xfrm>
-            <a:off x="7124673" y="3408521"/>
-            <a:ext cx="628884" cy="715581"/>
+            <a:off x="7184048" y="3408521"/>
+            <a:ext cx="736792" cy="507831"/>
           </a:xfrm>
           <a:prstGeom prst="rect">
             <a:avLst/>
@@ -5092,7 +5092,7 @@
         </p:nvCxnSpPr>
         <p:spPr>
           <a:xfrm flipH="1">
-            <a:off x="2787838" y="2626789"/>
+            <a:off x="3108470" y="2626789"/>
             <a:ext cx="289925" cy="0"/>
           </a:xfrm>
           <a:prstGeom prst="line">
@@ -5135,7 +5135,7 @@
         </p:nvCxnSpPr>
         <p:spPr>
           <a:xfrm flipH="1" flipV="1">
-            <a:off x="2939696" y="2630781"/>
+            <a:off x="3260328" y="2630781"/>
             <a:ext cx="5705" cy="777741"/>
           </a:xfrm>
           <a:prstGeom prst="line">
@@ -5176,7 +5176,7 @@
         </p:nvSpPr>
         <p:spPr>
           <a:xfrm>
-            <a:off x="2564799" y="3408520"/>
+            <a:off x="2885431" y="3408520"/>
             <a:ext cx="761199" cy="300082"/>
           </a:xfrm>
           <a:prstGeom prst="rect">
@@ -5217,7 +5217,7 @@
         </p:nvCxnSpPr>
         <p:spPr>
           <a:xfrm flipH="1">
-            <a:off x="3356369" y="2622799"/>
+            <a:off x="3677002" y="2622799"/>
             <a:ext cx="617406" cy="0"/>
           </a:xfrm>
           <a:prstGeom prst="line">
@@ -5260,7 +5260,7 @@
         </p:nvCxnSpPr>
         <p:spPr>
           <a:xfrm flipV="1">
-            <a:off x="3666400" y="2626792"/>
+            <a:off x="3987033" y="2626792"/>
             <a:ext cx="0" cy="390077"/>
           </a:xfrm>
           <a:prstGeom prst="line">
@@ -5301,7 +5301,7 @@
         </p:nvSpPr>
         <p:spPr>
           <a:xfrm>
-            <a:off x="3280621" y="3042097"/>
+            <a:off x="3601254" y="3042097"/>
             <a:ext cx="786149" cy="300082"/>
           </a:xfrm>
           <a:prstGeom prst="rect">
@@ -5342,7 +5342,7 @@
         </p:nvCxnSpPr>
         <p:spPr>
           <a:xfrm flipH="1" flipV="1">
-            <a:off x="7049662" y="2622801"/>
+            <a:off x="7132787" y="2622801"/>
             <a:ext cx="2" cy="393507"/>
           </a:xfrm>
           <a:prstGeom prst="line">
@@ -5385,7 +5385,7 @@
         </p:nvCxnSpPr>
         <p:spPr>
           <a:xfrm flipH="1">
-            <a:off x="6971929" y="2629600"/>
+            <a:off x="7055054" y="2629600"/>
             <a:ext cx="177776" cy="0"/>
           </a:xfrm>
           <a:prstGeom prst="line">
@@ -5426,8 +5426,8 @@
         </p:nvSpPr>
         <p:spPr>
           <a:xfrm>
-            <a:off x="6749936" y="3015861"/>
-            <a:ext cx="627205" cy="507831"/>
+            <a:off x="6785561" y="3015861"/>
+            <a:ext cx="695893" cy="300082"/>
           </a:xfrm>
           <a:prstGeom prst="rect">
             <a:avLst/>
@@ -6727,14 +6727,14 @@
           </a:ln>
           <a:extLst>
             <a:ext uri="{909E8E84-426E-40dd-AFC4-6F175D3DCCD1}">
-              <a14:hiddenFill xmlns="" xmlns:a14="http://schemas.microsoft.com/office/drawing/2010/main">
+              <a14:hiddenFill xmlns:a14="http://schemas.microsoft.com/office/drawing/2010/main" xmlns="">
                 <a:solidFill>
                   <a:srgbClr val="FFFFFF"/>
                 </a:solidFill>
               </a14:hiddenFill>
             </a:ext>
             <a:ext uri="{91240B29-F687-4f45-9708-019B960494DF}">
-              <a14:hiddenLine xmlns="" xmlns:a14="http://schemas.microsoft.com/office/drawing/2010/main" w="9525">
+              <a14:hiddenLine xmlns:a14="http://schemas.microsoft.com/office/drawing/2010/main" xmlns="" w="9525">
                 <a:solidFill>
                   <a:srgbClr val="000000"/>
                 </a:solidFill>
@@ -9080,8 +9080,8 @@
         </p:nvSpPr>
         <p:spPr>
           <a:xfrm>
-            <a:off x="5262661" y="2646215"/>
-            <a:ext cx="524533" cy="507831"/>
+            <a:off x="5142017" y="2646215"/>
+            <a:ext cx="645178" cy="300082"/>
           </a:xfrm>
           <a:prstGeom prst="rect">
             <a:avLst/>
@@ -9205,8 +9205,8 @@
         </p:nvSpPr>
         <p:spPr>
           <a:xfrm>
-            <a:off x="5541439" y="3034982"/>
-            <a:ext cx="439064" cy="507831"/>
+            <a:off x="5541438" y="3034982"/>
+            <a:ext cx="503101" cy="300082"/>
           </a:xfrm>
           <a:prstGeom prst="rect">
             <a:avLst/>
@@ -9757,9 +9757,9 @@
           <p:nvPr/>
         </p:nvCxnSpPr>
         <p:spPr>
-          <a:xfrm flipV="1">
-            <a:off x="9859937" y="4498044"/>
-            <a:ext cx="0" cy="785717"/>
+          <a:xfrm flipH="1" flipV="1">
+            <a:off x="9848064" y="4498045"/>
+            <a:ext cx="8456" cy="785716"/>
           </a:xfrm>
           <a:prstGeom prst="line">
             <a:avLst/>
@@ -9842,8 +9842,8 @@
         </p:nvSpPr>
         <p:spPr>
           <a:xfrm>
-            <a:off x="9597671" y="5283761"/>
-            <a:ext cx="524533" cy="507831"/>
+            <a:off x="9524010" y="5283761"/>
+            <a:ext cx="665019" cy="300082"/>
           </a:xfrm>
           <a:prstGeom prst="rect">
             <a:avLst/>
@@ -9967,8 +9967,8 @@
         </p:nvSpPr>
         <p:spPr>
           <a:xfrm>
-            <a:off x="8621794" y="5283761"/>
-            <a:ext cx="439064" cy="507831"/>
+            <a:off x="8573983" y="5283761"/>
+            <a:ext cx="534375" cy="300082"/>
           </a:xfrm>
           <a:prstGeom prst="rect">
             <a:avLst/>
@@ -10051,9 +10051,9 @@
           <p:nvPr/>
         </p:nvCxnSpPr>
         <p:spPr>
-          <a:xfrm flipV="1">
-            <a:off x="3111151" y="4506024"/>
-            <a:ext cx="1" cy="777737"/>
+          <a:xfrm flipH="1" flipV="1">
+            <a:off x="3111152" y="4506025"/>
+            <a:ext cx="6122" cy="777736"/>
           </a:xfrm>
           <a:prstGeom prst="line">
             <a:avLst/>
@@ -10093,8 +10093,8 @@
         </p:nvSpPr>
         <p:spPr>
           <a:xfrm>
-            <a:off x="2887963" y="5283761"/>
-            <a:ext cx="446375" cy="507831"/>
+            <a:off x="2850079" y="5283761"/>
+            <a:ext cx="534390" cy="300082"/>
           </a:xfrm>
           <a:prstGeom prst="rect">
             <a:avLst/>
@@ -10429,7 +10429,7 @@
         </p:nvSpPr>
         <p:spPr>
           <a:xfrm>
-            <a:off x="8532019" y="3439430"/>
+            <a:off x="8532019" y="3154422"/>
             <a:ext cx="985838" cy="507831"/>
           </a:xfrm>
           <a:prstGeom prst="rect">

</xml_diff>